<commit_message>
Updated scriptlinks.txt for #SPSKC
</commit_message>
<xml_diff>
--- a/SPSKC_CSR.pptx
+++ b/SPSKC_CSR.pptx
@@ -3305,334 +3305,6 @@
       <dsp:cNvGrpSpPr/>
     </dsp:nvGrpSpPr>
     <dsp:grpSpPr/>
-    <dsp:sp modelId="{AC944DED-EBB6-488E-BF26-669AE3A7F6BE}">
-      <dsp:nvSpPr>
-        <dsp:cNvPr id="0" name=""/>
-        <dsp:cNvSpPr/>
-      </dsp:nvSpPr>
-      <dsp:spPr>
-        <a:xfrm>
-          <a:off x="-134034" y="0"/>
-          <a:ext cx="10783669" cy="4530725"/>
-        </a:xfrm>
-        <a:prstGeom prst="diamond">
-          <a:avLst/>
-        </a:prstGeom>
-        <a:solidFill>
-          <a:srgbClr val="ECECEC">
-            <a:alpha val="0"/>
-          </a:srgbClr>
-        </a:solidFill>
-        <a:ln>
-          <a:noFill/>
-        </a:ln>
-        <a:effectLst/>
-      </dsp:spPr>
-      <dsp:style>
-        <a:lnRef idx="0">
-          <a:scrgbClr r="0" g="0" b="0"/>
-        </a:lnRef>
-        <a:fillRef idx="1">
-          <a:scrgbClr r="0" g="0" b="0"/>
-        </a:fillRef>
-        <a:effectRef idx="0">
-          <a:scrgbClr r="0" g="0" b="0"/>
-        </a:effectRef>
-        <a:fontRef idx="minor"/>
-      </dsp:style>
-    </dsp:sp>
-    <dsp:sp modelId="{A938AC64-1965-4837-94E0-32948ED8DF0E}">
-      <dsp:nvSpPr>
-        <dsp:cNvPr id="0" name=""/>
-        <dsp:cNvSpPr/>
-      </dsp:nvSpPr>
-      <dsp:spPr>
-        <a:xfrm>
-          <a:off x="1108197" y="147993"/>
-          <a:ext cx="3540008" cy="2024449"/>
-        </a:xfrm>
-        <a:prstGeom prst="roundRect">
-          <a:avLst/>
-        </a:prstGeom>
-        <a:solidFill>
-          <a:schemeClr val="accent1">
-            <a:hueOff val="0"/>
-            <a:satOff val="0"/>
-            <a:lumOff val="0"/>
-            <a:alphaOff val="0"/>
-          </a:schemeClr>
-        </a:solidFill>
-        <a:ln w="12700" cap="flat" cmpd="sng" algn="ctr">
-          <a:solidFill>
-            <a:schemeClr val="lt1">
-              <a:hueOff val="0"/>
-              <a:satOff val="0"/>
-              <a:lumOff val="0"/>
-              <a:alphaOff val="0"/>
-            </a:schemeClr>
-          </a:solidFill>
-          <a:prstDash val="solid"/>
-          <a:miter lim="800000"/>
-        </a:ln>
-        <a:effectLst/>
-      </dsp:spPr>
-      <dsp:style>
-        <a:lnRef idx="2">
-          <a:scrgbClr r="0" g="0" b="0"/>
-        </a:lnRef>
-        <a:fillRef idx="1">
-          <a:scrgbClr r="0" g="0" b="0"/>
-        </a:fillRef>
-        <a:effectRef idx="0">
-          <a:scrgbClr r="0" g="0" b="0"/>
-        </a:effectRef>
-        <a:fontRef idx="minor">
-          <a:schemeClr val="lt1"/>
-        </a:fontRef>
-      </dsp:style>
-      <dsp:txBody>
-        <a:bodyPr spcFirstLastPara="0" vert="horz" wrap="square" lIns="106680" tIns="106680" rIns="106680" bIns="106680" numCol="1" spcCol="1270" anchor="ctr" anchorCtr="0">
-          <a:noAutofit/>
-        </a:bodyPr>
-        <a:lstStyle/>
-        <a:p>
-          <a:pPr lvl="0" algn="ctr" defTabSz="1244600" rtl="0">
-            <a:lnSpc>
-              <a:spcPct val="90000"/>
-            </a:lnSpc>
-            <a:spcBef>
-              <a:spcPct val="0"/>
-            </a:spcBef>
-            <a:spcAft>
-              <a:spcPct val="35000"/>
-            </a:spcAft>
-          </a:pPr>
-          <a:r>
-            <a:rPr lang="en-US" sz="2800" kern="1200" dirty="0"/>
-            <a:t>Who? Developers </a:t>
-          </a:r>
-        </a:p>
-        <a:p>
-          <a:pPr lvl="0" algn="ctr" defTabSz="1244600" rtl="0">
-            <a:lnSpc>
-              <a:spcPct val="90000"/>
-            </a:lnSpc>
-            <a:spcBef>
-              <a:spcPct val="0"/>
-            </a:spcBef>
-            <a:spcAft>
-              <a:spcPct val="35000"/>
-            </a:spcAft>
-          </a:pPr>
-          <a:r>
-            <a:rPr lang="en-US" sz="2800" kern="1200" dirty="0"/>
-            <a:t>(including Citizen Developers)</a:t>
-          </a:r>
-        </a:p>
-      </dsp:txBody>
-      <dsp:txXfrm>
-        <a:off x="1207022" y="246818"/>
-        <a:ext cx="3342358" cy="1826799"/>
-      </dsp:txXfrm>
-    </dsp:sp>
-    <dsp:sp modelId="{9345D29A-389E-42F7-82F5-13738ADA8976}">
-      <dsp:nvSpPr>
-        <dsp:cNvPr id="0" name=""/>
-        <dsp:cNvSpPr/>
-      </dsp:nvSpPr>
-      <dsp:spPr>
-        <a:xfrm>
-          <a:off x="5875504" y="210818"/>
-          <a:ext cx="3589625" cy="1987078"/>
-        </a:xfrm>
-        <a:prstGeom prst="roundRect">
-          <a:avLst/>
-        </a:prstGeom>
-        <a:solidFill>
-          <a:schemeClr val="accent1">
-            <a:hueOff val="0"/>
-            <a:satOff val="0"/>
-            <a:lumOff val="0"/>
-            <a:alphaOff val="0"/>
-          </a:schemeClr>
-        </a:solidFill>
-        <a:ln w="12700" cap="flat" cmpd="sng" algn="ctr">
-          <a:solidFill>
-            <a:schemeClr val="lt1">
-              <a:hueOff val="0"/>
-              <a:satOff val="0"/>
-              <a:lumOff val="0"/>
-              <a:alphaOff val="0"/>
-            </a:schemeClr>
-          </a:solidFill>
-          <a:prstDash val="solid"/>
-          <a:miter lim="800000"/>
-        </a:ln>
-        <a:effectLst/>
-      </dsp:spPr>
-      <dsp:style>
-        <a:lnRef idx="2">
-          <a:scrgbClr r="0" g="0" b="0"/>
-        </a:lnRef>
-        <a:fillRef idx="1">
-          <a:scrgbClr r="0" g="0" b="0"/>
-        </a:fillRef>
-        <a:effectRef idx="0">
-          <a:scrgbClr r="0" g="0" b="0"/>
-        </a:effectRef>
-        <a:fontRef idx="minor">
-          <a:schemeClr val="lt1"/>
-        </a:fontRef>
-      </dsp:style>
-      <dsp:txBody>
-        <a:bodyPr spcFirstLastPara="0" vert="horz" wrap="square" lIns="106680" tIns="106680" rIns="106680" bIns="106680" numCol="1" spcCol="1270" anchor="ctr" anchorCtr="0">
-          <a:noAutofit/>
-        </a:bodyPr>
-        <a:lstStyle/>
-        <a:p>
-          <a:pPr lvl="0" algn="ctr" defTabSz="1244600" rtl="0">
-            <a:lnSpc>
-              <a:spcPct val="90000"/>
-            </a:lnSpc>
-            <a:spcBef>
-              <a:spcPct val="0"/>
-            </a:spcBef>
-            <a:spcAft>
-              <a:spcPct val="35000"/>
-            </a:spcAft>
-          </a:pPr>
-          <a:r>
-            <a:rPr lang="en-US" sz="2800" kern="1200" dirty="0"/>
-            <a:t>Show practical examples of CSR to customize forms (and possibly Views)</a:t>
-          </a:r>
-        </a:p>
-      </dsp:txBody>
-      <dsp:txXfrm>
-        <a:off x="5972505" y="307819"/>
-        <a:ext cx="3395623" cy="1793076"/>
-      </dsp:txXfrm>
-    </dsp:sp>
-    <dsp:sp modelId="{26309244-D78B-4147-92EB-687CA5A90E3A}">
-      <dsp:nvSpPr>
-        <dsp:cNvPr id="0" name=""/>
-        <dsp:cNvSpPr/>
-      </dsp:nvSpPr>
-      <dsp:spPr>
-        <a:xfrm>
-          <a:off x="3344552" y="2512884"/>
-          <a:ext cx="3521225" cy="1983438"/>
-        </a:xfrm>
-        <a:prstGeom prst="roundRect">
-          <a:avLst/>
-        </a:prstGeom>
-        <a:solidFill>
-          <a:schemeClr val="accent1">
-            <a:hueOff val="0"/>
-            <a:satOff val="0"/>
-            <a:lumOff val="0"/>
-            <a:alphaOff val="0"/>
-          </a:schemeClr>
-        </a:solidFill>
-        <a:ln w="12700" cap="flat" cmpd="sng" algn="ctr">
-          <a:solidFill>
-            <a:schemeClr val="lt1">
-              <a:hueOff val="0"/>
-              <a:satOff val="0"/>
-              <a:lumOff val="0"/>
-              <a:alphaOff val="0"/>
-            </a:schemeClr>
-          </a:solidFill>
-          <a:prstDash val="solid"/>
-          <a:miter lim="800000"/>
-        </a:ln>
-        <a:effectLst/>
-      </dsp:spPr>
-      <dsp:style>
-        <a:lnRef idx="2">
-          <a:scrgbClr r="0" g="0" b="0"/>
-        </a:lnRef>
-        <a:fillRef idx="1">
-          <a:scrgbClr r="0" g="0" b="0"/>
-        </a:fillRef>
-        <a:effectRef idx="0">
-          <a:scrgbClr r="0" g="0" b="0"/>
-        </a:effectRef>
-        <a:fontRef idx="minor">
-          <a:schemeClr val="lt1"/>
-        </a:fontRef>
-      </dsp:style>
-      <dsp:txBody>
-        <a:bodyPr spcFirstLastPara="0" vert="horz" wrap="square" lIns="106680" tIns="106680" rIns="106680" bIns="106680" numCol="1" spcCol="1270" anchor="ctr" anchorCtr="0">
-          <a:noAutofit/>
-        </a:bodyPr>
-        <a:lstStyle/>
-        <a:p>
-          <a:pPr lvl="0" algn="ctr" defTabSz="1244600" rtl="0">
-            <a:lnSpc>
-              <a:spcPct val="90000"/>
-            </a:lnSpc>
-            <a:spcBef>
-              <a:spcPct val="0"/>
-            </a:spcBef>
-            <a:spcAft>
-              <a:spcPct val="35000"/>
-            </a:spcAft>
-          </a:pPr>
-          <a:r>
-            <a:rPr lang="en-US" sz="2800" kern="1200" dirty="0"/>
-            <a:t>Talk about gotchas MDS, dep</a:t>
-          </a:r>
-          <a:r>
-            <a:rPr lang="en-US" sz="2800" b="1" kern="1200" dirty="0"/>
-            <a:t>lo</a:t>
-          </a:r>
-          <a:r>
-            <a:rPr lang="en-US" sz="2800" kern="1200" dirty="0"/>
-            <a:t>yment, JSLink limitations</a:t>
-          </a:r>
-        </a:p>
-      </dsp:txBody>
-      <dsp:txXfrm>
-        <a:off x="3441375" y="2609707"/>
-        <a:ext cx="3327579" cy="1789792"/>
-      </dsp:txXfrm>
-    </dsp:sp>
-    <dsp:sp modelId="{EEEB16C2-02E3-4B32-9461-82D301FB9452}">
-      <dsp:nvSpPr>
-        <dsp:cNvPr id="0" name=""/>
-        <dsp:cNvSpPr/>
-      </dsp:nvSpPr>
-      <dsp:spPr>
-        <a:xfrm>
-          <a:off x="9560282" y="4445168"/>
-          <a:ext cx="45711" cy="45711"/>
-        </a:xfrm>
-        <a:prstGeom prst="actionButtonBlank">
-          <a:avLst/>
-        </a:prstGeom>
-        <a:noFill/>
-        <a:ln w="12700" cap="flat" cmpd="sng" algn="ctr">
-          <a:noFill/>
-          <a:prstDash val="solid"/>
-          <a:miter lim="800000"/>
-        </a:ln>
-        <a:effectLst/>
-      </dsp:spPr>
-      <dsp:style>
-        <a:lnRef idx="2">
-          <a:scrgbClr r="0" g="0" b="0"/>
-        </a:lnRef>
-        <a:fillRef idx="1">
-          <a:scrgbClr r="0" g="0" b="0"/>
-        </a:fillRef>
-        <a:effectRef idx="0">
-          <a:scrgbClr r="0" g="0" b="0"/>
-        </a:effectRef>
-        <a:fontRef idx="minor">
-          <a:schemeClr val="lt1"/>
-        </a:fontRef>
-      </dsp:style>
-    </dsp:sp>
   </dsp:spTree>
 </dsp:drawing>
 </file>
@@ -3645,422 +3317,6 @@
       <dsp:cNvGrpSpPr/>
     </dsp:nvGrpSpPr>
     <dsp:grpSpPr/>
-    <dsp:sp modelId="{49121172-462D-4D7B-B892-B91EF6B7757D}">
-      <dsp:nvSpPr>
-        <dsp:cNvPr id="0" name=""/>
-        <dsp:cNvSpPr/>
-      </dsp:nvSpPr>
-      <dsp:spPr>
-        <a:xfrm>
-          <a:off x="0" y="0"/>
-          <a:ext cx="10537209" cy="1287269"/>
-        </a:xfrm>
-        <a:prstGeom prst="roundRect">
-          <a:avLst/>
-        </a:prstGeom>
-        <a:solidFill>
-          <a:srgbClr val="2E74B4"/>
-        </a:solidFill>
-        <a:ln w="12700" cap="flat" cmpd="sng" algn="ctr">
-          <a:solidFill>
-            <a:schemeClr val="lt1">
-              <a:hueOff val="0"/>
-              <a:satOff val="0"/>
-              <a:lumOff val="0"/>
-              <a:alphaOff val="0"/>
-            </a:schemeClr>
-          </a:solidFill>
-          <a:prstDash val="solid"/>
-          <a:miter lim="800000"/>
-        </a:ln>
-        <a:effectLst/>
-      </dsp:spPr>
-      <dsp:style>
-        <a:lnRef idx="2">
-          <a:scrgbClr r="0" g="0" b="0"/>
-        </a:lnRef>
-        <a:fillRef idx="1">
-          <a:scrgbClr r="0" g="0" b="0"/>
-        </a:fillRef>
-        <a:effectRef idx="0">
-          <a:scrgbClr r="0" g="0" b="0"/>
-        </a:effectRef>
-        <a:fontRef idx="minor">
-          <a:schemeClr val="lt1"/>
-        </a:fontRef>
-      </dsp:style>
-      <dsp:txBody>
-        <a:bodyPr spcFirstLastPara="0" vert="horz" wrap="square" lIns="121920" tIns="121920" rIns="121920" bIns="121920" numCol="1" spcCol="1270" anchor="ctr" anchorCtr="0">
-          <a:noAutofit/>
-        </a:bodyPr>
-        <a:lstStyle/>
-        <a:p>
-          <a:pPr lvl="0" algn="l" defTabSz="1422400" rtl="0">
-            <a:lnSpc>
-              <a:spcPct val="90000"/>
-            </a:lnSpc>
-            <a:spcBef>
-              <a:spcPct val="0"/>
-            </a:spcBef>
-            <a:spcAft>
-              <a:spcPct val="35000"/>
-            </a:spcAft>
-          </a:pPr>
-          <a:r>
-            <a:rPr lang="en-US" sz="3200" kern="1200" dirty="0"/>
-            <a:t>A mechanism to inject JavaScript into various pages</a:t>
-          </a:r>
-        </a:p>
-      </dsp:txBody>
-      <dsp:txXfrm>
-        <a:off x="62839" y="62839"/>
-        <a:ext cx="10411531" cy="1161591"/>
-      </dsp:txXfrm>
-    </dsp:sp>
-    <dsp:sp modelId="{D72AC7AB-600E-41F0-A1F1-04EC62A14A47}">
-      <dsp:nvSpPr>
-        <dsp:cNvPr id="0" name=""/>
-        <dsp:cNvSpPr/>
-      </dsp:nvSpPr>
-      <dsp:spPr>
-        <a:xfrm>
-          <a:off x="0" y="1377422"/>
-          <a:ext cx="10537209" cy="1287269"/>
-        </a:xfrm>
-        <a:prstGeom prst="roundRect">
-          <a:avLst/>
-        </a:prstGeom>
-        <a:solidFill>
-          <a:srgbClr val="BB5611"/>
-        </a:solidFill>
-        <a:ln w="12700" cap="flat" cmpd="sng" algn="ctr">
-          <a:solidFill>
-            <a:schemeClr val="lt1">
-              <a:hueOff val="0"/>
-              <a:satOff val="0"/>
-              <a:lumOff val="0"/>
-              <a:alphaOff val="0"/>
-            </a:schemeClr>
-          </a:solidFill>
-          <a:prstDash val="solid"/>
-          <a:miter lim="800000"/>
-        </a:ln>
-        <a:effectLst/>
-      </dsp:spPr>
-      <dsp:style>
-        <a:lnRef idx="2">
-          <a:scrgbClr r="0" g="0" b="0"/>
-        </a:lnRef>
-        <a:fillRef idx="1">
-          <a:scrgbClr r="0" g="0" b="0"/>
-        </a:fillRef>
-        <a:effectRef idx="0">
-          <a:scrgbClr r="0" g="0" b="0"/>
-        </a:effectRef>
-        <a:fontRef idx="minor">
-          <a:schemeClr val="lt1"/>
-        </a:fontRef>
-      </dsp:style>
-      <dsp:txBody>
-        <a:bodyPr spcFirstLastPara="0" vert="horz" wrap="square" lIns="121920" tIns="121920" rIns="121920" bIns="121920" numCol="1" spcCol="1270" anchor="ctr" anchorCtr="0">
-          <a:noAutofit/>
-        </a:bodyPr>
-        <a:lstStyle/>
-        <a:p>
-          <a:pPr lvl="0" algn="l" defTabSz="1422400" rtl="0">
-            <a:lnSpc>
-              <a:spcPct val="90000"/>
-            </a:lnSpc>
-            <a:spcBef>
-              <a:spcPct val="0"/>
-            </a:spcBef>
-            <a:spcAft>
-              <a:spcPct val="35000"/>
-            </a:spcAft>
-          </a:pPr>
-          <a:r>
-            <a:rPr lang="en-US" sz="3200" kern="1200" dirty="0"/>
-            <a:t>A property that can be set on various SharePoint objects</a:t>
-          </a:r>
-        </a:p>
-        <a:p>
-          <a:pPr lvl="0" algn="l" defTabSz="1422400" rtl="0">
-            <a:lnSpc>
-              <a:spcPct val="90000"/>
-            </a:lnSpc>
-            <a:spcBef>
-              <a:spcPct val="0"/>
-            </a:spcBef>
-            <a:spcAft>
-              <a:spcPct val="35000"/>
-            </a:spcAft>
-          </a:pPr>
-          <a:r>
-            <a:rPr lang="en-US" sz="500" kern="1200" dirty="0"/>
-            <a:t>      </a:t>
-          </a:r>
-          <a:r>
-            <a:rPr lang="en-US" sz="2000" kern="1200" dirty="0"/>
-            <a:t>- Form, Field, Content Type, View, List View Web Part (XLSTListViewWebPart)</a:t>
-          </a:r>
-          <a:endParaRPr lang="en-US" sz="500" kern="1200" dirty="0"/>
-        </a:p>
-      </dsp:txBody>
-      <dsp:txXfrm>
-        <a:off x="62839" y="1440261"/>
-        <a:ext cx="10411531" cy="1161591"/>
-      </dsp:txXfrm>
-    </dsp:sp>
-    <dsp:sp modelId="{9F78F9A8-91DB-4B53-9C97-66189ADC155B}">
-      <dsp:nvSpPr>
-        <dsp:cNvPr id="0" name=""/>
-        <dsp:cNvSpPr/>
-      </dsp:nvSpPr>
-      <dsp:spPr>
-        <a:xfrm>
-          <a:off x="0" y="2587637"/>
-          <a:ext cx="10537209" cy="62019"/>
-        </a:xfrm>
-        <a:prstGeom prst="rect">
-          <a:avLst/>
-        </a:prstGeom>
-        <a:noFill/>
-        <a:ln>
-          <a:noFill/>
-        </a:ln>
-        <a:effectLst/>
-      </dsp:spPr>
-      <dsp:style>
-        <a:lnRef idx="0">
-          <a:scrgbClr r="0" g="0" b="0"/>
-        </a:lnRef>
-        <a:fillRef idx="0">
-          <a:scrgbClr r="0" g="0" b="0"/>
-        </a:fillRef>
-        <a:effectRef idx="0">
-          <a:scrgbClr r="0" g="0" b="0"/>
-        </a:effectRef>
-        <a:fontRef idx="minor"/>
-      </dsp:style>
-      <dsp:txBody>
-        <a:bodyPr spcFirstLastPara="0" vert="horz" wrap="square" lIns="334556" tIns="6350" rIns="35560" bIns="6350" numCol="1" spcCol="1270" anchor="t" anchorCtr="0">
-          <a:noAutofit/>
-        </a:bodyPr>
-        <a:lstStyle/>
-        <a:p>
-          <a:pPr marL="57150" lvl="1" indent="-57150" algn="l" defTabSz="177800" rtl="0">
-            <a:lnSpc>
-              <a:spcPct val="90000"/>
-            </a:lnSpc>
-            <a:spcBef>
-              <a:spcPct val="0"/>
-            </a:spcBef>
-            <a:spcAft>
-              <a:spcPct val="20000"/>
-            </a:spcAft>
-            <a:buChar char="••"/>
-          </a:pPr>
-          <a:endParaRPr lang="en-US" sz="400" kern="1200" dirty="0"/>
-        </a:p>
-      </dsp:txBody>
-      <dsp:txXfrm>
-        <a:off x="0" y="2587637"/>
-        <a:ext cx="10537209" cy="62019"/>
-      </dsp:txXfrm>
-    </dsp:sp>
-    <dsp:sp modelId="{1A186D14-F1CB-4CF9-8AD8-6C09CA5E9B12}">
-      <dsp:nvSpPr>
-        <dsp:cNvPr id="0" name=""/>
-        <dsp:cNvSpPr/>
-      </dsp:nvSpPr>
-      <dsp:spPr>
-        <a:xfrm>
-          <a:off x="0" y="2713988"/>
-          <a:ext cx="10537209" cy="1287269"/>
-        </a:xfrm>
-        <a:prstGeom prst="roundRect">
-          <a:avLst/>
-        </a:prstGeom>
-        <a:solidFill>
-          <a:srgbClr val="4F7B31"/>
-        </a:solidFill>
-        <a:ln w="12700" cap="flat" cmpd="sng" algn="ctr">
-          <a:solidFill>
-            <a:schemeClr val="lt1">
-              <a:hueOff val="0"/>
-              <a:satOff val="0"/>
-              <a:lumOff val="0"/>
-              <a:alphaOff val="0"/>
-            </a:schemeClr>
-          </a:solidFill>
-          <a:prstDash val="solid"/>
-          <a:miter lim="800000"/>
-        </a:ln>
-        <a:effectLst/>
-      </dsp:spPr>
-      <dsp:style>
-        <a:lnRef idx="2">
-          <a:scrgbClr r="0" g="0" b="0"/>
-        </a:lnRef>
-        <a:fillRef idx="1">
-          <a:scrgbClr r="0" g="0" b="0"/>
-        </a:fillRef>
-        <a:effectRef idx="0">
-          <a:scrgbClr r="0" g="0" b="0"/>
-        </a:effectRef>
-        <a:fontRef idx="minor">
-          <a:schemeClr val="lt1"/>
-        </a:fontRef>
-      </dsp:style>
-      <dsp:txBody>
-        <a:bodyPr spcFirstLastPara="0" vert="horz" wrap="square" lIns="121920" tIns="121920" rIns="121920" bIns="121920" numCol="1" spcCol="1270" anchor="ctr" anchorCtr="0">
-          <a:noAutofit/>
-        </a:bodyPr>
-        <a:lstStyle/>
-        <a:p>
-          <a:pPr lvl="0" algn="l" defTabSz="1422400" rtl="0">
-            <a:lnSpc>
-              <a:spcPct val="90000"/>
-            </a:lnSpc>
-            <a:spcBef>
-              <a:spcPct val="0"/>
-            </a:spcBef>
-            <a:spcAft>
-              <a:spcPts val="600"/>
-            </a:spcAft>
-          </a:pPr>
-          <a:r>
-            <a:rPr lang="en-US" sz="3200" kern="1200" dirty="0"/>
-            <a:t>CSR depends on a mechanism to inject JavaScript</a:t>
-          </a:r>
-        </a:p>
-        <a:p>
-          <a:pPr lvl="0" algn="l" defTabSz="1422400" rtl="0">
-            <a:lnSpc>
-              <a:spcPct val="90000"/>
-            </a:lnSpc>
-            <a:spcBef>
-              <a:spcPct val="0"/>
-            </a:spcBef>
-            <a:spcAft>
-              <a:spcPts val="0"/>
-            </a:spcAft>
-          </a:pPr>
-          <a:r>
-            <a:rPr lang="en-US" sz="1800" kern="1200" dirty="0"/>
-            <a:t>      - It does </a:t>
-          </a:r>
-          <a:r>
-            <a:rPr lang="en-US" sz="1800" b="1" u="sng" kern="1200" dirty="0"/>
-            <a:t>NOT</a:t>
-          </a:r>
-          <a:r>
-            <a:rPr lang="en-US" sz="1800" kern="1200" dirty="0"/>
-            <a:t> depend on JSLink</a:t>
-          </a:r>
-        </a:p>
-        <a:p>
-          <a:pPr lvl="0" algn="l" defTabSz="1422400" rtl="0">
-            <a:lnSpc>
-              <a:spcPct val="90000"/>
-            </a:lnSpc>
-            <a:spcBef>
-              <a:spcPct val="0"/>
-            </a:spcBef>
-            <a:spcAft>
-              <a:spcPts val="0"/>
-            </a:spcAft>
-          </a:pPr>
-          <a:r>
-            <a:rPr lang="en-US" sz="1800" kern="1200" dirty="0"/>
-            <a:t>      - There are other </a:t>
-          </a:r>
-          <a:r>
-            <a:rPr lang="en-US" sz="1800" kern="1200" dirty="0" smtClean="0"/>
-            <a:t>alternatives (Custom Actions, CEWP, etc.)</a:t>
-          </a:r>
-          <a:endParaRPr lang="en-US" sz="1800" kern="1200" dirty="0"/>
-        </a:p>
-        <a:p>
-          <a:pPr lvl="0" algn="l" defTabSz="1422400" rtl="0">
-            <a:lnSpc>
-              <a:spcPct val="90000"/>
-            </a:lnSpc>
-            <a:spcBef>
-              <a:spcPct val="0"/>
-            </a:spcBef>
-            <a:spcAft>
-              <a:spcPts val="0"/>
-            </a:spcAft>
-          </a:pPr>
-          <a:r>
-            <a:rPr lang="en-US" sz="1800" kern="1200" dirty="0"/>
-            <a:t>      - In some cases, JSLink works quite well with CSR, in others it does not play well with CSR at all</a:t>
-          </a:r>
-        </a:p>
-      </dsp:txBody>
-      <dsp:txXfrm>
-        <a:off x="62839" y="2776827"/>
-        <a:ext cx="10411531" cy="1161591"/>
-      </dsp:txXfrm>
-    </dsp:sp>
-    <dsp:sp modelId="{728BF77C-9C68-40F1-BB96-F8B36C52BBC6}">
-      <dsp:nvSpPr>
-        <dsp:cNvPr id="0" name=""/>
-        <dsp:cNvSpPr/>
-      </dsp:nvSpPr>
-      <dsp:spPr>
-        <a:xfrm>
-          <a:off x="0" y="3936926"/>
-          <a:ext cx="10537209" cy="62019"/>
-        </a:xfrm>
-        <a:prstGeom prst="rect">
-          <a:avLst/>
-        </a:prstGeom>
-        <a:noFill/>
-        <a:ln>
-          <a:noFill/>
-        </a:ln>
-        <a:effectLst/>
-      </dsp:spPr>
-      <dsp:style>
-        <a:lnRef idx="0">
-          <a:scrgbClr r="0" g="0" b="0"/>
-        </a:lnRef>
-        <a:fillRef idx="0">
-          <a:scrgbClr r="0" g="0" b="0"/>
-        </a:fillRef>
-        <a:effectRef idx="0">
-          <a:scrgbClr r="0" g="0" b="0"/>
-        </a:effectRef>
-        <a:fontRef idx="minor"/>
-      </dsp:style>
-      <dsp:txBody>
-        <a:bodyPr spcFirstLastPara="0" vert="horz" wrap="square" lIns="334556" tIns="6350" rIns="35560" bIns="6350" numCol="1" spcCol="1270" anchor="t" anchorCtr="0">
-          <a:noAutofit/>
-        </a:bodyPr>
-        <a:lstStyle/>
-        <a:p>
-          <a:pPr marL="57150" lvl="1" indent="-57150" algn="l" defTabSz="177800" rtl="0">
-            <a:lnSpc>
-              <a:spcPct val="90000"/>
-            </a:lnSpc>
-            <a:spcBef>
-              <a:spcPct val="0"/>
-            </a:spcBef>
-            <a:spcAft>
-              <a:spcPct val="20000"/>
-            </a:spcAft>
-            <a:buChar char="••"/>
-          </a:pPr>
-          <a:endParaRPr lang="en-US" sz="400" kern="1200" dirty="0"/>
-        </a:p>
-      </dsp:txBody>
-      <dsp:txXfrm>
-        <a:off x="0" y="3936926"/>
-        <a:ext cx="10537209" cy="62019"/>
-      </dsp:txXfrm>
-    </dsp:sp>
   </dsp:spTree>
 </dsp:drawing>
 </file>
@@ -4073,245 +3329,6 @@
       <dsp:cNvGrpSpPr/>
     </dsp:nvGrpSpPr>
     <dsp:grpSpPr/>
-    <dsp:sp modelId="{4F694A87-5DD4-43B4-B523-06D5ED9AEA4B}">
-      <dsp:nvSpPr>
-        <dsp:cNvPr id="0" name=""/>
-        <dsp:cNvSpPr/>
-      </dsp:nvSpPr>
-      <dsp:spPr>
-        <a:xfrm>
-          <a:off x="0" y="1775"/>
-          <a:ext cx="10515600" cy="1989922"/>
-        </a:xfrm>
-        <a:prstGeom prst="roundRect">
-          <a:avLst/>
-        </a:prstGeom>
-        <a:solidFill>
-          <a:srgbClr val="2A6BA6"/>
-        </a:solidFill>
-        <a:ln w="12700" cap="flat" cmpd="sng" algn="ctr">
-          <a:solidFill>
-            <a:schemeClr val="lt1">
-              <a:hueOff val="0"/>
-              <a:satOff val="0"/>
-              <a:lumOff val="0"/>
-              <a:alphaOff val="0"/>
-            </a:schemeClr>
-          </a:solidFill>
-          <a:prstDash val="solid"/>
-          <a:miter lim="800000"/>
-        </a:ln>
-        <a:effectLst/>
-      </dsp:spPr>
-      <dsp:style>
-        <a:lnRef idx="2">
-          <a:scrgbClr r="0" g="0" b="0"/>
-        </a:lnRef>
-        <a:fillRef idx="1">
-          <a:scrgbClr r="0" g="0" b="0"/>
-        </a:fillRef>
-        <a:effectRef idx="0">
-          <a:scrgbClr r="0" g="0" b="0"/>
-        </a:effectRef>
-        <a:fontRef idx="minor">
-          <a:schemeClr val="lt1"/>
-        </a:fontRef>
-      </dsp:style>
-      <dsp:txBody>
-        <a:bodyPr spcFirstLastPara="0" vert="horz" wrap="square" lIns="137160" tIns="137160" rIns="137160" bIns="137160" numCol="1" spcCol="1270" anchor="ctr" anchorCtr="0">
-          <a:noAutofit/>
-        </a:bodyPr>
-        <a:lstStyle/>
-        <a:p>
-          <a:pPr lvl="0" algn="l" defTabSz="1600200" rtl="0">
-            <a:lnSpc>
-              <a:spcPct val="90000"/>
-            </a:lnSpc>
-            <a:spcBef>
-              <a:spcPct val="0"/>
-            </a:spcBef>
-            <a:spcAft>
-              <a:spcPct val="35000"/>
-            </a:spcAft>
-          </a:pPr>
-          <a:r>
-            <a:rPr lang="en-US" sz="3600" kern="1200" dirty="0"/>
-            <a:t>In general, it just means pushing much of the presentation logic from the server (XSLT) to the client (JavaScript)</a:t>
-          </a:r>
-        </a:p>
-      </dsp:txBody>
-      <dsp:txXfrm>
-        <a:off x="97140" y="98915"/>
-        <a:ext cx="10321320" cy="1795642"/>
-      </dsp:txXfrm>
-    </dsp:sp>
-    <dsp:sp modelId="{D29B4909-0F47-468C-84E0-A467C5F3E634}">
-      <dsp:nvSpPr>
-        <dsp:cNvPr id="0" name=""/>
-        <dsp:cNvSpPr/>
-      </dsp:nvSpPr>
-      <dsp:spPr>
-        <a:xfrm>
-          <a:off x="0" y="2005099"/>
-          <a:ext cx="10515600" cy="1989922"/>
-        </a:xfrm>
-        <a:prstGeom prst="roundRect">
-          <a:avLst/>
-        </a:prstGeom>
-        <a:solidFill>
-          <a:srgbClr val="4A742E"/>
-        </a:solidFill>
-        <a:ln w="12700" cap="flat" cmpd="sng" algn="ctr">
-          <a:solidFill>
-            <a:schemeClr val="lt1">
-              <a:hueOff val="0"/>
-              <a:satOff val="0"/>
-              <a:lumOff val="0"/>
-              <a:alphaOff val="0"/>
-            </a:schemeClr>
-          </a:solidFill>
-          <a:prstDash val="solid"/>
-          <a:miter lim="800000"/>
-        </a:ln>
-        <a:effectLst/>
-      </dsp:spPr>
-      <dsp:style>
-        <a:lnRef idx="2">
-          <a:scrgbClr r="0" g="0" b="0"/>
-        </a:lnRef>
-        <a:fillRef idx="1">
-          <a:scrgbClr r="0" g="0" b="0"/>
-        </a:fillRef>
-        <a:effectRef idx="0">
-          <a:scrgbClr r="0" g="0" b="0"/>
-        </a:effectRef>
-        <a:fontRef idx="minor">
-          <a:schemeClr val="lt1"/>
-        </a:fontRef>
-      </dsp:style>
-      <dsp:txBody>
-        <a:bodyPr spcFirstLastPara="0" vert="horz" wrap="square" lIns="91440" tIns="91440" rIns="91440" bIns="91440" numCol="1" spcCol="1270" anchor="ctr" anchorCtr="0">
-          <a:noAutofit/>
-        </a:bodyPr>
-        <a:lstStyle/>
-        <a:p>
-          <a:pPr lvl="0" algn="l" defTabSz="1066800" rtl="0">
-            <a:lnSpc>
-              <a:spcPct val="90000"/>
-            </a:lnSpc>
-            <a:spcBef>
-              <a:spcPct val="0"/>
-            </a:spcBef>
-            <a:spcAft>
-              <a:spcPct val="35000"/>
-            </a:spcAft>
-          </a:pPr>
-          <a:r>
-            <a:rPr lang="en-US" sz="2400" kern="1200" dirty="0"/>
-            <a:t>In SharePoint, it is a framework for overriding the built-in presentation logic of new, edit, and display forms, views, and search results using HTML, CSS, and JavaScript</a:t>
-          </a:r>
-        </a:p>
-        <a:p>
-          <a:pPr lvl="0" algn="l" defTabSz="1066800" rtl="0">
-            <a:lnSpc>
-              <a:spcPct val="90000"/>
-            </a:lnSpc>
-            <a:spcBef>
-              <a:spcPct val="0"/>
-            </a:spcBef>
-            <a:spcAft>
-              <a:spcPts val="0"/>
-            </a:spcAft>
-          </a:pPr>
-          <a:r>
-            <a:rPr lang="en-US" sz="1800" kern="1200" dirty="0"/>
-            <a:t>    - </a:t>
-          </a:r>
-          <a:r>
-            <a:rPr lang="en-US" sz="2000" kern="1200" dirty="0"/>
-            <a:t>Depends on a mechanism for injecting JavaScript into one or more SharePoint    </a:t>
-          </a:r>
-        </a:p>
-        <a:p>
-          <a:pPr lvl="0" algn="l" defTabSz="1066800" rtl="0">
-            <a:lnSpc>
-              <a:spcPct val="90000"/>
-            </a:lnSpc>
-            <a:spcBef>
-              <a:spcPct val="0"/>
-            </a:spcBef>
-            <a:spcAft>
-              <a:spcPts val="0"/>
-            </a:spcAft>
-          </a:pPr>
-          <a:r>
-            <a:rPr lang="en-US" sz="2000" kern="1200" dirty="0"/>
-            <a:t>      pages</a:t>
-          </a:r>
-        </a:p>
-      </dsp:txBody>
-      <dsp:txXfrm>
-        <a:off x="97140" y="2102239"/>
-        <a:ext cx="10321320" cy="1795642"/>
-      </dsp:txXfrm>
-    </dsp:sp>
-    <dsp:sp modelId="{F37F4947-6993-4131-8E52-6FEFE9332518}">
-      <dsp:nvSpPr>
-        <dsp:cNvPr id="0" name=""/>
-        <dsp:cNvSpPr/>
-      </dsp:nvSpPr>
-      <dsp:spPr>
-        <a:xfrm>
-          <a:off x="0" y="3995022"/>
-          <a:ext cx="10515600" cy="77058"/>
-        </a:xfrm>
-        <a:prstGeom prst="rect">
-          <a:avLst/>
-        </a:prstGeom>
-        <a:noFill/>
-        <a:ln>
-          <a:noFill/>
-        </a:ln>
-        <a:effectLst/>
-      </dsp:spPr>
-      <dsp:style>
-        <a:lnRef idx="0">
-          <a:scrgbClr r="0" g="0" b="0"/>
-        </a:lnRef>
-        <a:fillRef idx="0">
-          <a:scrgbClr r="0" g="0" b="0"/>
-        </a:fillRef>
-        <a:effectRef idx="0">
-          <a:scrgbClr r="0" g="0" b="0"/>
-        </a:effectRef>
-        <a:fontRef idx="minor"/>
-      </dsp:style>
-      <dsp:txBody>
-        <a:bodyPr spcFirstLastPara="0" vert="horz" wrap="square" lIns="333870" tIns="6350" rIns="35560" bIns="6350" numCol="1" spcCol="1270" anchor="t" anchorCtr="0">
-          <a:noAutofit/>
-        </a:bodyPr>
-        <a:lstStyle/>
-        <a:p>
-          <a:pPr marL="57150" lvl="1" indent="-57150" algn="l" defTabSz="177800" rtl="0">
-            <a:lnSpc>
-              <a:spcPct val="90000"/>
-            </a:lnSpc>
-            <a:spcBef>
-              <a:spcPct val="0"/>
-            </a:spcBef>
-            <a:spcAft>
-              <a:spcPct val="20000"/>
-            </a:spcAft>
-            <a:buChar char="••"/>
-          </a:pPr>
-          <a:endParaRPr lang="en-US" sz="400" kern="1200" dirty="0"/>
-        </a:p>
-      </dsp:txBody>
-      <dsp:txXfrm>
-        <a:off x="0" y="3995022"/>
-        <a:ext cx="10515600" cy="77058"/>
-      </dsp:txXfrm>
-    </dsp:sp>
   </dsp:spTree>
 </dsp:drawing>
 </file>
@@ -19460,7 +18477,7 @@
         </p:spPr>
         <p:txBody>
           <a:bodyPr>
-            <a:normAutofit fontScale="92500" lnSpcReduction="10000"/>
+            <a:normAutofit/>
           </a:bodyPr>
           <a:lstStyle/>
           <a:p>
@@ -20057,16 +19074,19 @@
                 <a:ea typeface="Calibri" panose="020F0502020204030204" pitchFamily="34" charset="0"/>
                 <a:cs typeface="Times New Roman" panose="02020603050405020304" pitchFamily="18" charset="0"/>
               </a:rPr>
-              <a:t>        });</a:t>
-            </a:r>
-            <a:endParaRPr lang="en-US" sz="1100" dirty="0">
-              <a:solidFill>
-                <a:prstClr val="black"/>
-              </a:solidFill>
-              <a:latin typeface="Calibri" panose="020F0502020204030204" pitchFamily="34" charset="0"/>
-              <a:ea typeface="Calibri" panose="020F0502020204030204" pitchFamily="34" charset="0"/>
-              <a:cs typeface="Times New Roman" panose="02020603050405020304" pitchFamily="18" charset="0"/>
-            </a:endParaRPr>
+              <a:t>        </a:t>
+            </a:r>
+            <a:r>
+              <a:rPr lang="en-US" sz="1100" dirty="0" smtClean="0">
+                <a:solidFill>
+                  <a:srgbClr val="000000"/>
+                </a:solidFill>
+                <a:latin typeface="Consolas" panose="020B0609020204030204" pitchFamily="49" charset="0"/>
+                <a:ea typeface="Calibri" panose="020F0502020204030204" pitchFamily="34" charset="0"/>
+                <a:cs typeface="Times New Roman" panose="02020603050405020304" pitchFamily="18" charset="0"/>
+              </a:rPr>
+              <a:t>});</a:t>
+            </a:r>
           </a:p>
           <a:p>
             <a:pPr marL="0" lvl="0" indent="0">
@@ -20079,336 +19099,16 @@
               <a:buNone/>
             </a:pPr>
             <a:r>
-              <a:rPr lang="en-US" sz="1100" dirty="0">
-                <a:solidFill>
-                  <a:srgbClr val="000000"/>
-                </a:solidFill>
-                <a:latin typeface="Consolas" panose="020B0609020204030204" pitchFamily="49" charset="0"/>
+              <a:rPr lang="en-US" sz="1100" dirty="0" smtClean="0">
+                <a:solidFill>
+                  <a:prstClr val="black"/>
+                </a:solidFill>
+                <a:latin typeface="Calibri" panose="020F0502020204030204" pitchFamily="34" charset="0"/>
                 <a:ea typeface="Calibri" panose="020F0502020204030204" pitchFamily="34" charset="0"/>
                 <a:cs typeface="Times New Roman" panose="02020603050405020304" pitchFamily="18" charset="0"/>
               </a:rPr>
-              <a:t> </a:t>
-            </a:r>
-            <a:endParaRPr lang="en-US" sz="1100" dirty="0">
-              <a:solidFill>
-                <a:prstClr val="black"/>
-              </a:solidFill>
-              <a:latin typeface="Calibri" panose="020F0502020204030204" pitchFamily="34" charset="0"/>
-              <a:ea typeface="Calibri" panose="020F0502020204030204" pitchFamily="34" charset="0"/>
-              <a:cs typeface="Times New Roman" panose="02020603050405020304" pitchFamily="18" charset="0"/>
-            </a:endParaRPr>
-          </a:p>
-          <a:p>
-            <a:pPr marL="0" lvl="0" indent="0">
-              <a:lnSpc>
-                <a:spcPct val="107000"/>
-              </a:lnSpc>
-              <a:spcBef>
-                <a:spcPts val="0"/>
-              </a:spcBef>
-              <a:buNone/>
-            </a:pPr>
-            <a:r>
-              <a:rPr lang="en-US" sz="1100" dirty="0">
-                <a:solidFill>
-                  <a:srgbClr val="008000"/>
-                </a:solidFill>
-                <a:latin typeface="Consolas" panose="020B0609020204030204" pitchFamily="49" charset="0"/>
-                <a:ea typeface="Calibri" panose="020F0502020204030204" pitchFamily="34" charset="0"/>
-                <a:cs typeface="Times New Roman" panose="02020603050405020304" pitchFamily="18" charset="0"/>
-              </a:rPr>
-              <a:t>        // create a custom validator with an object literal</a:t>
-            </a:r>
-            <a:endParaRPr lang="en-US" sz="1100" dirty="0">
-              <a:solidFill>
-                <a:prstClr val="black"/>
-              </a:solidFill>
-              <a:latin typeface="Calibri" panose="020F0502020204030204" pitchFamily="34" charset="0"/>
-              <a:ea typeface="Calibri" panose="020F0502020204030204" pitchFamily="34" charset="0"/>
-              <a:cs typeface="Times New Roman" panose="02020603050405020304" pitchFamily="18" charset="0"/>
-            </a:endParaRPr>
-          </a:p>
-          <a:p>
-            <a:pPr marL="0" lvl="0" indent="0">
-              <a:lnSpc>
-                <a:spcPct val="107000"/>
-              </a:lnSpc>
-              <a:spcBef>
-                <a:spcPts val="0"/>
-              </a:spcBef>
-              <a:buNone/>
-            </a:pPr>
-            <a:r>
-              <a:rPr lang="en-US" sz="1100" dirty="0">
-                <a:solidFill>
-                  <a:srgbClr val="000000"/>
-                </a:solidFill>
-                <a:latin typeface="Consolas" panose="020B0609020204030204" pitchFamily="49" charset="0"/>
-                <a:ea typeface="Calibri" panose="020F0502020204030204" pitchFamily="34" charset="0"/>
-                <a:cs typeface="Times New Roman" panose="02020603050405020304" pitchFamily="18" charset="0"/>
-              </a:rPr>
-              <a:t>        fieldValidators.RegisterValidator({</a:t>
-            </a:r>
-            <a:endParaRPr lang="en-US" sz="1100" dirty="0">
-              <a:solidFill>
-                <a:prstClr val="black"/>
-              </a:solidFill>
-              <a:latin typeface="Calibri" panose="020F0502020204030204" pitchFamily="34" charset="0"/>
-              <a:ea typeface="Calibri" panose="020F0502020204030204" pitchFamily="34" charset="0"/>
-              <a:cs typeface="Times New Roman" panose="02020603050405020304" pitchFamily="18" charset="0"/>
-            </a:endParaRPr>
-          </a:p>
-          <a:p>
-            <a:pPr marL="0" lvl="0" indent="0">
-              <a:lnSpc>
-                <a:spcPct val="107000"/>
-              </a:lnSpc>
-              <a:spcBef>
-                <a:spcPts val="0"/>
-              </a:spcBef>
-              <a:buNone/>
-            </a:pPr>
-            <a:r>
-              <a:rPr lang="en-US" sz="1100" dirty="0">
-                <a:solidFill>
-                  <a:srgbClr val="000000"/>
-                </a:solidFill>
-                <a:latin typeface="Consolas" panose="020B0609020204030204" pitchFamily="49" charset="0"/>
-                <a:ea typeface="Calibri" panose="020F0502020204030204" pitchFamily="34" charset="0"/>
-                <a:cs typeface="Times New Roman" panose="02020603050405020304" pitchFamily="18" charset="0"/>
-              </a:rPr>
-              <a:t>            Validate: </a:t>
-            </a:r>
-            <a:r>
-              <a:rPr lang="en-US" sz="1100" dirty="0">
-                <a:solidFill>
-                  <a:srgbClr val="0000FF"/>
-                </a:solidFill>
-                <a:latin typeface="Consolas" panose="020B0609020204030204" pitchFamily="49" charset="0"/>
-                <a:ea typeface="Calibri" panose="020F0502020204030204" pitchFamily="34" charset="0"/>
-                <a:cs typeface="Times New Roman" panose="02020603050405020304" pitchFamily="18" charset="0"/>
-              </a:rPr>
-              <a:t>function</a:t>
-            </a:r>
-            <a:r>
-              <a:rPr lang="en-US" sz="1100" dirty="0">
-                <a:solidFill>
-                  <a:srgbClr val="000000"/>
-                </a:solidFill>
-                <a:latin typeface="Consolas" panose="020B0609020204030204" pitchFamily="49" charset="0"/>
-                <a:ea typeface="Calibri" panose="020F0502020204030204" pitchFamily="34" charset="0"/>
-                <a:cs typeface="Times New Roman" panose="02020603050405020304" pitchFamily="18" charset="0"/>
-              </a:rPr>
-              <a:t> (value) {  </a:t>
-            </a:r>
-            <a:r>
-              <a:rPr lang="en-US" sz="1100" dirty="0">
-                <a:solidFill>
-                  <a:srgbClr val="008000"/>
-                </a:solidFill>
-                <a:latin typeface="Consolas" panose="020B0609020204030204" pitchFamily="49" charset="0"/>
-                <a:ea typeface="Calibri" panose="020F0502020204030204" pitchFamily="34" charset="0"/>
-                <a:cs typeface="Times New Roman" panose="02020603050405020304" pitchFamily="18" charset="0"/>
-              </a:rPr>
-              <a:t>// do some validation</a:t>
-            </a:r>
-            <a:endParaRPr lang="en-US" sz="1100" dirty="0">
-              <a:solidFill>
-                <a:prstClr val="black"/>
-              </a:solidFill>
-              <a:latin typeface="Calibri" panose="020F0502020204030204" pitchFamily="34" charset="0"/>
-              <a:ea typeface="Calibri" panose="020F0502020204030204" pitchFamily="34" charset="0"/>
-              <a:cs typeface="Times New Roman" panose="02020603050405020304" pitchFamily="18" charset="0"/>
-            </a:endParaRPr>
-          </a:p>
-          <a:p>
-            <a:pPr marL="0" lvl="0" indent="0">
-              <a:lnSpc>
-                <a:spcPct val="107000"/>
-              </a:lnSpc>
-              <a:spcBef>
-                <a:spcPts val="0"/>
-              </a:spcBef>
-              <a:buNone/>
-            </a:pPr>
-            <a:r>
-              <a:rPr lang="en-US" sz="1100" dirty="0">
-                <a:solidFill>
-                  <a:srgbClr val="000000"/>
-                </a:solidFill>
-                <a:latin typeface="Consolas" panose="020B0609020204030204" pitchFamily="49" charset="0"/>
-                <a:ea typeface="Calibri" panose="020F0502020204030204" pitchFamily="34" charset="0"/>
-                <a:cs typeface="Times New Roman" panose="02020603050405020304" pitchFamily="18" charset="0"/>
-              </a:rPr>
-              <a:t>                </a:t>
-            </a:r>
-            <a:r>
-              <a:rPr lang="en-US" sz="1100" dirty="0">
-                <a:solidFill>
-                  <a:srgbClr val="0000FF"/>
-                </a:solidFill>
-                <a:latin typeface="Consolas" panose="020B0609020204030204" pitchFamily="49" charset="0"/>
-                <a:ea typeface="Calibri" panose="020F0502020204030204" pitchFamily="34" charset="0"/>
-                <a:cs typeface="Times New Roman" panose="02020603050405020304" pitchFamily="18" charset="0"/>
-              </a:rPr>
-              <a:t>return</a:t>
-            </a:r>
-            <a:r>
-              <a:rPr lang="en-US" sz="1100" dirty="0">
-                <a:solidFill>
-                  <a:srgbClr val="000000"/>
-                </a:solidFill>
-                <a:latin typeface="Consolas" panose="020B0609020204030204" pitchFamily="49" charset="0"/>
-                <a:ea typeface="Calibri" panose="020F0502020204030204" pitchFamily="34" charset="0"/>
-                <a:cs typeface="Times New Roman" panose="02020603050405020304" pitchFamily="18" charset="0"/>
-              </a:rPr>
               <a:t> </a:t>
             </a:r>
-            <a:r>
-              <a:rPr lang="en-US" sz="1100" dirty="0">
-                <a:solidFill>
-                  <a:srgbClr val="0000FF"/>
-                </a:solidFill>
-                <a:latin typeface="Consolas" panose="020B0609020204030204" pitchFamily="49" charset="0"/>
-                <a:ea typeface="Calibri" panose="020F0502020204030204" pitchFamily="34" charset="0"/>
-                <a:cs typeface="Times New Roman" panose="02020603050405020304" pitchFamily="18" charset="0"/>
-              </a:rPr>
-              <a:t>new</a:t>
-            </a:r>
-            <a:r>
-              <a:rPr lang="en-US" sz="1100" dirty="0">
-                <a:solidFill>
-                  <a:srgbClr val="000000"/>
-                </a:solidFill>
-                <a:latin typeface="Consolas" panose="020B0609020204030204" pitchFamily="49" charset="0"/>
-                <a:ea typeface="Calibri" panose="020F0502020204030204" pitchFamily="34" charset="0"/>
-                <a:cs typeface="Times New Roman" panose="02020603050405020304" pitchFamily="18" charset="0"/>
-              </a:rPr>
-              <a:t> SPClientForms.ClientValidation.ValidationResult(</a:t>
-            </a:r>
-            <a:r>
-              <a:rPr lang="en-US" sz="1100" dirty="0">
-                <a:solidFill>
-                  <a:srgbClr val="0000FF"/>
-                </a:solidFill>
-                <a:latin typeface="Consolas" panose="020B0609020204030204" pitchFamily="49" charset="0"/>
-                <a:ea typeface="Calibri" panose="020F0502020204030204" pitchFamily="34" charset="0"/>
-                <a:cs typeface="Times New Roman" panose="02020603050405020304" pitchFamily="18" charset="0"/>
-              </a:rPr>
-              <a:t>false</a:t>
-            </a:r>
-            <a:r>
-              <a:rPr lang="en-US" sz="1100" dirty="0">
-                <a:solidFill>
-                  <a:srgbClr val="000000"/>
-                </a:solidFill>
-                <a:latin typeface="Consolas" panose="020B0609020204030204" pitchFamily="49" charset="0"/>
-                <a:ea typeface="Calibri" panose="020F0502020204030204" pitchFamily="34" charset="0"/>
-                <a:cs typeface="Times New Roman" panose="02020603050405020304" pitchFamily="18" charset="0"/>
-              </a:rPr>
-              <a:t>, </a:t>
-            </a:r>
-            <a:r>
-              <a:rPr lang="en-US" sz="1100" dirty="0">
-                <a:solidFill>
-                  <a:srgbClr val="A31515"/>
-                </a:solidFill>
-                <a:latin typeface="Consolas" panose="020B0609020204030204" pitchFamily="49" charset="0"/>
-                <a:ea typeface="Calibri" panose="020F0502020204030204" pitchFamily="34" charset="0"/>
-                <a:cs typeface="Times New Roman" panose="02020603050405020304" pitchFamily="18" charset="0"/>
-              </a:rPr>
-              <a:t>''</a:t>
-            </a:r>
-            <a:r>
-              <a:rPr lang="en-US" sz="1100" dirty="0">
-                <a:solidFill>
-                  <a:srgbClr val="000000"/>
-                </a:solidFill>
-                <a:latin typeface="Consolas" panose="020B0609020204030204" pitchFamily="49" charset="0"/>
-                <a:ea typeface="Calibri" panose="020F0502020204030204" pitchFamily="34" charset="0"/>
-                <a:cs typeface="Times New Roman" panose="02020603050405020304" pitchFamily="18" charset="0"/>
-              </a:rPr>
-              <a:t>);</a:t>
-            </a:r>
-            <a:endParaRPr lang="en-US" sz="1100" dirty="0">
-              <a:solidFill>
-                <a:prstClr val="black"/>
-              </a:solidFill>
-              <a:latin typeface="Calibri" panose="020F0502020204030204" pitchFamily="34" charset="0"/>
-              <a:ea typeface="Calibri" panose="020F0502020204030204" pitchFamily="34" charset="0"/>
-              <a:cs typeface="Times New Roman" panose="02020603050405020304" pitchFamily="18" charset="0"/>
-            </a:endParaRPr>
-          </a:p>
-          <a:p>
-            <a:pPr marL="0" lvl="0" indent="0">
-              <a:lnSpc>
-                <a:spcPct val="107000"/>
-              </a:lnSpc>
-              <a:spcBef>
-                <a:spcPts val="0"/>
-              </a:spcBef>
-              <a:buNone/>
-            </a:pPr>
-            <a:r>
-              <a:rPr lang="en-US" sz="1100" dirty="0">
-                <a:solidFill>
-                  <a:srgbClr val="000000"/>
-                </a:solidFill>
-                <a:latin typeface="Consolas" panose="020B0609020204030204" pitchFamily="49" charset="0"/>
-                <a:ea typeface="Calibri" panose="020F0502020204030204" pitchFamily="34" charset="0"/>
-                <a:cs typeface="Times New Roman" panose="02020603050405020304" pitchFamily="18" charset="0"/>
-              </a:rPr>
-              <a:t>            }</a:t>
-            </a:r>
-            <a:endParaRPr lang="en-US" sz="1100" dirty="0">
-              <a:solidFill>
-                <a:prstClr val="black"/>
-              </a:solidFill>
-              <a:latin typeface="Calibri" panose="020F0502020204030204" pitchFamily="34" charset="0"/>
-              <a:ea typeface="Calibri" panose="020F0502020204030204" pitchFamily="34" charset="0"/>
-              <a:cs typeface="Times New Roman" panose="02020603050405020304" pitchFamily="18" charset="0"/>
-            </a:endParaRPr>
-          </a:p>
-          <a:p>
-            <a:pPr marL="0" lvl="0" indent="0">
-              <a:lnSpc>
-                <a:spcPct val="107000"/>
-              </a:lnSpc>
-              <a:spcBef>
-                <a:spcPts val="0"/>
-              </a:spcBef>
-              <a:buNone/>
-            </a:pPr>
-            <a:r>
-              <a:rPr lang="en-US" sz="1100" dirty="0">
-                <a:solidFill>
-                  <a:srgbClr val="000000"/>
-                </a:solidFill>
-                <a:latin typeface="Consolas" panose="020B0609020204030204" pitchFamily="49" charset="0"/>
-                <a:ea typeface="Calibri" panose="020F0502020204030204" pitchFamily="34" charset="0"/>
-                <a:cs typeface="Times New Roman" panose="02020603050405020304" pitchFamily="18" charset="0"/>
-              </a:rPr>
-              <a:t>        });</a:t>
-            </a:r>
-            <a:endParaRPr lang="en-US" sz="1100" dirty="0">
-              <a:solidFill>
-                <a:prstClr val="black"/>
-              </a:solidFill>
-              <a:latin typeface="Calibri" panose="020F0502020204030204" pitchFamily="34" charset="0"/>
-              <a:ea typeface="Calibri" panose="020F0502020204030204" pitchFamily="34" charset="0"/>
-              <a:cs typeface="Times New Roman" panose="02020603050405020304" pitchFamily="18" charset="0"/>
-            </a:endParaRPr>
-          </a:p>
-          <a:p>
-            <a:pPr marL="0" lvl="0" indent="0">
-              <a:lnSpc>
-                <a:spcPct val="107000"/>
-              </a:lnSpc>
-              <a:spcBef>
-                <a:spcPts val="0"/>
-              </a:spcBef>
-              <a:buNone/>
-            </a:pPr>
             <a:r>
               <a:rPr lang="en-US" sz="1100" dirty="0">
                 <a:solidFill>
@@ -26027,6 +24727,15 @@
 </file>
 
 <file path=customXml/item1.xml><?xml version="1.0" encoding="utf-8"?>
+<?mso-contentType ?>
+<FormTemplates xmlns="http://schemas.microsoft.com/sharepoint/v3/contenttype/forms">
+  <Display>DocumentLibraryForm</Display>
+  <Edit>DocumentLibraryForm</Edit>
+  <New>DocumentLibraryForm</New>
+</FormTemplates>
+</file>
+
+<file path=customXml/item2.xml><?xml version="1.0" encoding="utf-8"?>
 <ct:contentTypeSchema xmlns:ct="http://schemas.microsoft.com/office/2006/metadata/contentType" xmlns:ma="http://schemas.microsoft.com/office/2006/metadata/properties/metaAttributes" ct:_="" ma:_="" ma:contentTypeName="Unknown Document Type" ma:contentTypeID="0x010104" ma:contentTypeVersion="0" ma:contentTypeDescription="" ma:contentTypeScope="" ma:versionID="05d83ceaa0bbd2e3bc716e6e66bd857a">
   <xsd:schema xmlns:xsd="http://www.w3.org/2001/XMLSchema" xmlns:xs="http://www.w3.org/2001/XMLSchema" xmlns:p="http://schemas.microsoft.com/office/2006/metadata/properties" targetNamespace="http://schemas.microsoft.com/office/2006/metadata/properties" ma:root="true" ma:fieldsID="b3d69fe45253d5ff147bb69036b756a7">
     <xsd:element name="properties">
@@ -26140,15 +24849,6 @@
 </ct:contentTypeSchema>
 </file>
 
-<file path=customXml/item2.xml><?xml version="1.0" encoding="utf-8"?>
-<?mso-contentType ?>
-<FormTemplates xmlns="http://schemas.microsoft.com/sharepoint/v3/contenttype/forms">
-  <Display>DocumentLibraryForm</Display>
-  <Edit>DocumentLibraryForm</Edit>
-  <New>DocumentLibraryForm</New>
-</FormTemplates>
-</file>
-
 <file path=customXml/item3.xml><?xml version="1.0" encoding="utf-8"?>
 <p:properties xmlns:p="http://schemas.microsoft.com/office/2006/metadata/properties" xmlns:xsi="http://www.w3.org/2001/XMLSchema-instance" xmlns:pc="http://schemas.microsoft.com/office/infopath/2007/PartnerControls">
   <documentManagement/>
@@ -26156,6 +24856,14 @@
 </file>
 
 <file path=customXml/itemProps1.xml><?xml version="1.0" encoding="utf-8"?>
+<ds:datastoreItem xmlns:ds="http://schemas.openxmlformats.org/officeDocument/2006/customXml" ds:itemID="{BD3838D6-D387-47DB-98DE-E6AD820770DE}">
+  <ds:schemaRefs>
+    <ds:schemaRef ds:uri="http://schemas.microsoft.com/sharepoint/v3/contenttype/forms"/>
+  </ds:schemaRefs>
+</ds:datastoreItem>
+</file>
+
+<file path=customXml/itemProps2.xml><?xml version="1.0" encoding="utf-8"?>
 <ds:datastoreItem xmlns:ds="http://schemas.openxmlformats.org/officeDocument/2006/customXml" ds:itemID="{25DF74AC-AFCB-44E7-907E-698D70C63A06}">
   <ds:schemaRefs>
     <ds:schemaRef ds:uri="http://schemas.microsoft.com/office/2006/metadata/contentType"/>
@@ -26167,14 +24875,6 @@
     <ds:schemaRef ds:uri="http://purl.org/dc/terms/"/>
     <ds:schemaRef ds:uri="http://schemas.microsoft.com/internal/obd"/>
     <ds:schemaRef ds:uri="http://schemas.microsoft.com/office/infopath/2007/PartnerControls"/>
-  </ds:schemaRefs>
-</ds:datastoreItem>
-</file>
-
-<file path=customXml/itemProps2.xml><?xml version="1.0" encoding="utf-8"?>
-<ds:datastoreItem xmlns:ds="http://schemas.openxmlformats.org/officeDocument/2006/customXml" ds:itemID="{BD3838D6-D387-47DB-98DE-E6AD820770DE}">
-  <ds:schemaRefs>
-    <ds:schemaRef ds:uri="http://schemas.microsoft.com/sharepoint/v3/contenttype/forms"/>
   </ds:schemaRefs>
 </ds:datastoreItem>
 </file>

</xml_diff>